<commit_message>
Bilder für Power Point
</commit_message>
<xml_diff>
--- a/Stand der Dinge.pptx
+++ b/Stand der Dinge.pptx
@@ -113,6 +113,11 @@
       </a:defRPr>
     </a:lvl9pPr>
   </p:defaultTextStyle>
+  <p:extLst>
+    <p:ext uri="{EFAFB233-063F-42B5-8137-9DF3F51BA10A}">
+      <p15:sldGuideLst xmlns:p15="http://schemas.microsoft.com/office/powerpoint/2012/main"/>
+    </p:ext>
+  </p:extLst>
 </p:presentation>
 </file>
 
@@ -267,7 +272,7 @@
           <a:p>
             <a:fld id="{11008460-8B2F-4AAA-A4E2-10730069204C}" type="datetimeFigureOut">
               <a:rPr lang="en-US" smtClean="0"/>
-              <a:t>1/8/2023</a:t>
+              <a:t>1/10/2023</a:t>
             </a:fld>
             <a:endParaRPr lang="en-US"/>
           </a:p>
@@ -2611,7 +2616,7 @@
           <a:p>
             <a:fld id="{11008460-8B2F-4AAA-A4E2-10730069204C}" type="datetimeFigureOut">
               <a:rPr lang="en-US" smtClean="0"/>
-              <a:t>1/8/2023</a:t>
+              <a:t>1/10/2023</a:t>
             </a:fld>
             <a:endParaRPr lang="en-US"/>
           </a:p>
@@ -4955,7 +4960,7 @@
           <a:p>
             <a:fld id="{11008460-8B2F-4AAA-A4E2-10730069204C}" type="datetimeFigureOut">
               <a:rPr lang="en-US" smtClean="0"/>
-              <a:t>1/8/2023</a:t>
+              <a:t>1/10/2023</a:t>
             </a:fld>
             <a:endParaRPr lang="en-US"/>
           </a:p>
@@ -5153,7 +5158,7 @@
           <a:p>
             <a:fld id="{11008460-8B2F-4AAA-A4E2-10730069204C}" type="datetimeFigureOut">
               <a:rPr lang="en-US" smtClean="0"/>
-              <a:t>1/8/2023</a:t>
+              <a:t>1/10/2023</a:t>
             </a:fld>
             <a:endParaRPr lang="en-US"/>
           </a:p>
@@ -5426,7 +5431,7 @@
           <a:p>
             <a:fld id="{11008460-8B2F-4AAA-A4E2-10730069204C}" type="datetimeFigureOut">
               <a:rPr lang="en-US" smtClean="0"/>
-              <a:t>1/8/2023</a:t>
+              <a:t>1/10/2023</a:t>
             </a:fld>
             <a:endParaRPr lang="en-US"/>
           </a:p>
@@ -5691,7 +5696,7 @@
           <a:p>
             <a:fld id="{11008460-8B2F-4AAA-A4E2-10730069204C}" type="datetimeFigureOut">
               <a:rPr lang="en-US" smtClean="0"/>
-              <a:t>1/8/2023</a:t>
+              <a:t>1/10/2023</a:t>
             </a:fld>
             <a:endParaRPr lang="en-US"/>
           </a:p>
@@ -6107,7 +6112,7 @@
           <a:p>
             <a:fld id="{11008460-8B2F-4AAA-A4E2-10730069204C}" type="datetimeFigureOut">
               <a:rPr lang="en-US" smtClean="0"/>
-              <a:t>1/8/2023</a:t>
+              <a:t>1/10/2023</a:t>
             </a:fld>
             <a:endParaRPr lang="en-US"/>
           </a:p>
@@ -6248,7 +6253,7 @@
           <a:p>
             <a:fld id="{11008460-8B2F-4AAA-A4E2-10730069204C}" type="datetimeFigureOut">
               <a:rPr lang="en-US" smtClean="0"/>
-              <a:t>1/8/2023</a:t>
+              <a:t>1/10/2023</a:t>
             </a:fld>
             <a:endParaRPr lang="en-US"/>
           </a:p>
@@ -6361,7 +6366,7 @@
           <a:p>
             <a:fld id="{11008460-8B2F-4AAA-A4E2-10730069204C}" type="datetimeFigureOut">
               <a:rPr lang="en-US" smtClean="0"/>
-              <a:t>1/8/2023</a:t>
+              <a:t>1/10/2023</a:t>
             </a:fld>
             <a:endParaRPr lang="en-US"/>
           </a:p>
@@ -6672,7 +6677,7 @@
           <a:p>
             <a:fld id="{11008460-8B2F-4AAA-A4E2-10730069204C}" type="datetimeFigureOut">
               <a:rPr lang="en-US" smtClean="0"/>
-              <a:t>1/8/2023</a:t>
+              <a:t>1/10/2023</a:t>
             </a:fld>
             <a:endParaRPr lang="en-US"/>
           </a:p>
@@ -6960,7 +6965,7 @@
           <a:p>
             <a:fld id="{11008460-8B2F-4AAA-A4E2-10730069204C}" type="datetimeFigureOut">
               <a:rPr lang="en-US" smtClean="0"/>
-              <a:t>1/8/2023</a:t>
+              <a:t>1/10/2023</a:t>
             </a:fld>
             <a:endParaRPr lang="en-US"/>
           </a:p>
@@ -9338,7 +9343,7 @@
             <a:fld id="{11008460-8B2F-4AAA-A4E2-10730069204C}" type="datetimeFigureOut">
               <a:rPr lang="en-US" smtClean="0"/>
               <a:pPr/>
-              <a:t>1/8/2023</a:t>
+              <a:t>1/10/2023</a:t>
             </a:fld>
             <a:endParaRPr lang="en-US" dirty="0"/>
           </a:p>
@@ -14203,43 +14208,64 @@
             <p:ph type="title"/>
           </p:nvPr>
         </p:nvSpPr>
-        <p:spPr/>
+        <p:spPr>
+          <a:xfrm>
+            <a:off x="966744" y="959587"/>
+            <a:ext cx="1844189" cy="2604880"/>
+          </a:xfrm>
+        </p:spPr>
         <p:txBody>
-          <a:bodyPr/>
+          <a:bodyPr>
+            <a:normAutofit/>
+          </a:bodyPr>
           <a:lstStyle/>
           <a:p>
+            <a:r>
+              <a:rPr lang="de-DE" dirty="0" err="1"/>
+              <a:t>Anim-ationen</a:t>
+            </a:r>
             <a:r>
               <a:rPr lang="de-DE" dirty="0"/>
-              <a:t>Animationen </a:t>
+              <a:t> </a:t>
             </a:r>
           </a:p>
         </p:txBody>
       </p:sp>
-      <p:sp>
-        <p:nvSpPr>
-          <p:cNvPr id="3" name="Inhaltsplatzhalter 2">
+      <p:pic>
+        <p:nvPicPr>
+          <p:cNvPr id="5" name="Inhaltsplatzhalter 4">
             <a:extLst>
               <a:ext uri="{FF2B5EF4-FFF2-40B4-BE49-F238E27FC236}">
-                <a16:creationId xmlns:a16="http://schemas.microsoft.com/office/drawing/2014/main" id="{9B7E4F4B-4864-32AA-BEA4-95595D7D2C0A}"/>
+                <a16:creationId xmlns:a16="http://schemas.microsoft.com/office/drawing/2014/main" id="{33618118-29C0-48E7-B3A9-BEF83258DA9A}"/>
               </a:ext>
             </a:extLst>
           </p:cNvPr>
-          <p:cNvSpPr>
-            <a:spLocks noGrp="1"/>
-          </p:cNvSpPr>
+          <p:cNvPicPr>
+            <a:picLocks noGrp="1" noChangeAspect="1"/>
+          </p:cNvPicPr>
           <p:nvPr>
             <p:ph idx="1"/>
           </p:nvPr>
-        </p:nvSpPr>
-        <p:spPr/>
-        <p:txBody>
-          <a:bodyPr/>
-          <a:lstStyle/>
-          <a:p>
-            <a:endParaRPr lang="de-DE"/>
-          </a:p>
-        </p:txBody>
-      </p:sp>
+        </p:nvPicPr>
+        <p:blipFill>
+          <a:blip r:embed="rId2">
+            <a:extLst>
+              <a:ext uri="{28A0092B-C50C-407E-A947-70E740481C1C}">
+                <a14:useLocalDpi xmlns:a14="http://schemas.microsoft.com/office/drawing/2010/main" val="0"/>
+              </a:ext>
+            </a:extLst>
+          </a:blip>
+          <a:stretch>
+            <a:fillRect/>
+          </a:stretch>
+        </p:blipFill>
+        <p:spPr>
+          <a:xfrm>
+            <a:off x="2988623" y="0"/>
+            <a:ext cx="9203377" cy="6858000"/>
+          </a:xfrm>
+        </p:spPr>
+      </p:pic>
     </p:spTree>
     <p:extLst>
       <p:ext uri="{BB962C8B-B14F-4D97-AF65-F5344CB8AC3E}">
@@ -14286,7 +14312,12 @@
             <p:ph type="title"/>
           </p:nvPr>
         </p:nvSpPr>
-        <p:spPr/>
+        <p:spPr>
+          <a:xfrm>
+            <a:off x="382544" y="354322"/>
+            <a:ext cx="9076329" cy="1064277"/>
+          </a:xfrm>
+        </p:spPr>
         <p:txBody>
           <a:bodyPr/>
           <a:lstStyle/>
@@ -14298,31 +14329,41 @@
           </a:p>
         </p:txBody>
       </p:sp>
-      <p:sp>
-        <p:nvSpPr>
-          <p:cNvPr id="3" name="Inhaltsplatzhalter 2">
+      <p:pic>
+        <p:nvPicPr>
+          <p:cNvPr id="5" name="Inhaltsplatzhalter 4">
             <a:extLst>
               <a:ext uri="{FF2B5EF4-FFF2-40B4-BE49-F238E27FC236}">
-                <a16:creationId xmlns:a16="http://schemas.microsoft.com/office/drawing/2014/main" id="{04A59047-F125-047C-8A8D-621E1925E8A5}"/>
+                <a16:creationId xmlns:a16="http://schemas.microsoft.com/office/drawing/2014/main" id="{E9A77BD1-4AD3-4FBF-B6C4-92FD6842D8E2}"/>
               </a:ext>
             </a:extLst>
           </p:cNvPr>
-          <p:cNvSpPr>
-            <a:spLocks noGrp="1"/>
-          </p:cNvSpPr>
+          <p:cNvPicPr>
+            <a:picLocks noGrp="1" noChangeAspect="1"/>
+          </p:cNvPicPr>
           <p:nvPr>
             <p:ph idx="1"/>
           </p:nvPr>
-        </p:nvSpPr>
-        <p:spPr/>
-        <p:txBody>
-          <a:bodyPr/>
-          <a:lstStyle/>
-          <a:p>
-            <a:endParaRPr lang="de-DE"/>
-          </a:p>
-        </p:txBody>
-      </p:sp>
+        </p:nvPicPr>
+        <p:blipFill>
+          <a:blip r:embed="rId2">
+            <a:extLst>
+              <a:ext uri="{28A0092B-C50C-407E-A947-70E740481C1C}">
+                <a14:useLocalDpi xmlns:a14="http://schemas.microsoft.com/office/drawing/2010/main" val="0"/>
+              </a:ext>
+            </a:extLst>
+          </a:blip>
+          <a:stretch>
+            <a:fillRect/>
+          </a:stretch>
+        </p:blipFill>
+        <p:spPr>
+          <a:xfrm>
+            <a:off x="0" y="1418599"/>
+            <a:ext cx="12192000" cy="5439401"/>
+          </a:xfrm>
+        </p:spPr>
+      </p:pic>
     </p:spTree>
     <p:extLst>
       <p:ext uri="{BB962C8B-B14F-4D97-AF65-F5344CB8AC3E}">

</xml_diff>